<commit_message>
Late Changes to Chap 3 PPTX Content
</commit_message>
<xml_diff>
--- a/Teaching/Chemistry/FCC Chem 3A Chap  3 Content.pptx
+++ b/Teaching/Chemistry/FCC Chem 3A Chap  3 Content.pptx
@@ -15839,10 +15839,10 @@
       </p:grpSpPr>
       <p:sp>
         <p:nvSpPr>
-          <p:cNvPr id="4" name="Title 3">
+          <p:cNvPr id="3" name="Title 2">
             <a:extLst>
               <a:ext uri="{FF2B5EF4-FFF2-40B4-BE49-F238E27FC236}">
-                <a16:creationId xmlns:a16="http://schemas.microsoft.com/office/drawing/2014/main" id="{F24B865D-5DA3-6C23-2A19-B874111D5765}"/>
+                <a16:creationId xmlns:a16="http://schemas.microsoft.com/office/drawing/2014/main" id="{85A80972-7737-085E-3207-5FA5F59ACF72}"/>
               </a:ext>
             </a:extLst>
           </p:cNvPr>
@@ -15855,15 +15855,18 @@
         </p:nvSpPr>
         <p:spPr>
           <a:xfrm>
-            <a:off x="364067" y="306073"/>
-            <a:ext cx="8421512" cy="707886"/>
+            <a:off x="349955" y="184939"/>
+            <a:ext cx="8421512" cy="646331"/>
           </a:xfrm>
         </p:spPr>
         <p:txBody>
           <a:bodyPr/>
           <a:lstStyle/>
           <a:p>
-            <a:endParaRPr lang="en-US" sz="4000" dirty="0"/>
+            <a:r>
+              <a:rPr lang="en-US" sz="3600" dirty="0"/>
+              <a:t>Concepts</a:t>
+            </a:r>
           </a:p>
         </p:txBody>
       </p:sp>
@@ -15883,27 +15886,86 @@
             <p:ph idx="1"/>
           </p:nvPr>
         </p:nvSpPr>
-        <p:spPr/>
+        <p:spPr>
+          <a:xfrm>
+            <a:off x="366888" y="895382"/>
+            <a:ext cx="8404579" cy="5713567"/>
+          </a:xfrm>
+        </p:spPr>
         <p:txBody>
           <a:bodyPr/>
           <a:lstStyle/>
           <a:p>
             <a:r>
-              <a:rPr lang="en-US" sz="2800" dirty="0"/>
+              <a:rPr lang="en-US" dirty="0"/>
               <a:t>Waves</a:t>
             </a:r>
           </a:p>
           <a:p>
             <a:r>
-              <a:rPr lang="en-US" sz="2800" dirty="0"/>
+              <a:rPr lang="en-US" dirty="0"/>
               <a:t>Observations on Atom Structure</a:t>
             </a:r>
           </a:p>
           <a:p>
-            <a:pPr marL="0" indent="0">
-              <a:buNone/>
-            </a:pPr>
-            <a:endParaRPr lang="en-US" sz="2800" dirty="0"/>
+            <a:r>
+              <a:rPr lang="en-US" dirty="0"/>
+              <a:t>Electromagnetic Radiation &amp; Spectrum</a:t>
+            </a:r>
+          </a:p>
+          <a:p>
+            <a:r>
+              <a:rPr lang="en-US" dirty="0"/>
+              <a:t>Quantized Nature of Energy</a:t>
+            </a:r>
+          </a:p>
+          <a:p>
+            <a:r>
+              <a:rPr lang="en-US" dirty="0"/>
+              <a:t>Energy levels of Electrons</a:t>
+            </a:r>
+          </a:p>
+          <a:p>
+            <a:r>
+              <a:rPr lang="en-US" dirty="0"/>
+              <a:t>Quantum Mechanical Model of Atom</a:t>
+            </a:r>
+          </a:p>
+          <a:p>
+            <a:r>
+              <a:rPr lang="en-US" dirty="0"/>
+              <a:t>Electron "Identity": Quantum Numbers</a:t>
+            </a:r>
+          </a:p>
+          <a:p>
+            <a:r>
+              <a:rPr lang="en-US" dirty="0"/>
+              <a:t>Shells, Subshells</a:t>
+            </a:r>
+          </a:p>
+          <a:p>
+            <a:r>
+              <a:rPr lang="en-US" dirty="0"/>
+              <a:t>Orbitals and their "Shapes"</a:t>
+            </a:r>
+          </a:p>
+          <a:p>
+            <a:r>
+              <a:rPr lang="en-US" dirty="0"/>
+              <a:t>Populating (Filling) Electrons: Electron Configuration</a:t>
+            </a:r>
+          </a:p>
+          <a:p>
+            <a:r>
+              <a:rPr lang="en-US" dirty="0"/>
+              <a:t>Related Trends in Periodic Table</a:t>
+            </a:r>
+          </a:p>
+          <a:p>
+            <a:r>
+              <a:rPr lang="en-US" dirty="0"/>
+              <a:t>Atomic Radius, Ionization Energy, Electron Affinity</a:t>
+            </a:r>
           </a:p>
         </p:txBody>
       </p:sp>
@@ -21943,8 +22005,8 @@
           </a:p>
         </p:txBody>
       </p:sp>
-      <mc:AlternateContent xmlns:mc="http://schemas.openxmlformats.org/markup-compatibility/2006">
-        <mc:Choice xmlns:a14="http://schemas.microsoft.com/office/drawing/2010/main" Requires="a14">
+      <mc:AlternateContent xmlns:mc="http://schemas.openxmlformats.org/markup-compatibility/2006" xmlns:a14="http://schemas.microsoft.com/office/drawing/2010/main">
+        <mc:Choice Requires="a14">
           <p:sp>
             <p:nvSpPr>
               <p:cNvPr id="3" name="Content Placeholder 2">
@@ -22256,7 +22318,7 @@
                         <a:rPr lang="en-US" b="0" i="0" baseline="30000" smtClean="0">
                           <a:latin typeface="Cambria Math" panose="02040503050406030204" pitchFamily="18" charset="0"/>
                         </a:rPr>
-                        <m:t>-1</m:t>
+                        <m:t>−1</m:t>
                       </m:r>
                       <m:r>
                         <m:rPr>
@@ -22331,7 +22393,7 @@
             </p:txBody>
           </p:sp>
         </mc:Choice>
-        <mc:Fallback>
+        <mc:Fallback xmlns="">
           <p:sp>
             <p:nvSpPr>
               <p:cNvPr id="3" name="Content Placeholder 2">
@@ -22972,8 +23034,8 @@
           </a:p>
         </p:txBody>
       </p:sp>
-      <mc:AlternateContent xmlns:mc="http://schemas.openxmlformats.org/markup-compatibility/2006">
-        <mc:Choice xmlns:a14="http://schemas.microsoft.com/office/drawing/2010/main" Requires="a14">
+      <mc:AlternateContent xmlns:mc="http://schemas.openxmlformats.org/markup-compatibility/2006" xmlns:a14="http://schemas.microsoft.com/office/drawing/2010/main">
+        <mc:Choice Requires="a14">
           <p:sp>
             <p:nvSpPr>
               <p:cNvPr id="3" name="Content Placeholder 2">
@@ -23613,7 +23675,7 @@
             </p:txBody>
           </p:sp>
         </mc:Choice>
-        <mc:Fallback>
+        <mc:Fallback xmlns="">
           <p:sp>
             <p:nvSpPr>
               <p:cNvPr id="3" name="Content Placeholder 2">

</xml_diff>